<commit_message>
mise à jour skills et correctif
</commit_message>
<xml_diff>
--- a/CV2.pptx
+++ b/CV2.pptx
@@ -239,7 +239,7 @@
           </a:bodyPr>
           <a:p>
             <a:pPr algn="r"/>
-            <a:fld id="{6E79F2E1-118B-4BBB-8707-186F76068899}" type="slidenum">
+            <a:fld id="{89556892-CE43-4ADF-8CF3-0556A439561B}" type="slidenum">
               <a:rPr b="0" lang="fr-FR" sz="1400" spc="-1" strike="noStrike">
                 <a:latin typeface="Times New Roman"/>
               </a:rPr>
@@ -287,7 +287,7 @@
         <p:spPr>
           <a:xfrm>
             <a:off x="2225520" y="1239840"/>
-            <a:ext cx="2367720" cy="3347280"/>
+            <a:ext cx="2367000" cy="3346560"/>
           </a:xfrm>
           <a:prstGeom prst="rect">
             <a:avLst/>
@@ -307,7 +307,7 @@
         <p:spPr>
           <a:xfrm>
             <a:off x="681840" y="4773240"/>
-            <a:ext cx="5455080" cy="3904920"/>
+            <a:ext cx="5454360" cy="3904200"/>
           </a:xfrm>
           <a:prstGeom prst="rect">
             <a:avLst/>
@@ -333,7 +333,7 @@
         <p:spPr>
           <a:xfrm>
             <a:off x="3863160" y="9421200"/>
-            <a:ext cx="2954520" cy="496800"/>
+            <a:ext cx="2953800" cy="496080"/>
           </a:xfrm>
           <a:prstGeom prst="rect">
             <a:avLst/>
@@ -359,7 +359,7 @@
                 <a:spcPct val="100000"/>
               </a:lnSpc>
             </a:pPr>
-            <a:fld id="{19433943-07CB-47AF-B93A-133D12CA2A5C}" type="slidenum">
+            <a:fld id="{30A557EF-1FB2-4604-B5C9-B534E9A584A8}" type="slidenum">
               <a:rPr b="0" lang="fr-FR" sz="1200" spc="-1" strike="noStrike">
                 <a:solidFill>
                   <a:srgbClr val="000000"/>
@@ -431,8 +431,8 @@
         </p:nvSpPr>
         <p:spPr>
           <a:xfrm>
-            <a:off x="567360" y="3320280"/>
-            <a:ext cx="6427800" cy="2290320"/>
+            <a:off x="378000" y="426240"/>
+            <a:ext cx="6806160" cy="1784520"/>
           </a:xfrm>
           <a:prstGeom prst="rect">
             <a:avLst/>
@@ -544,8 +544,8 @@
         </p:nvSpPr>
         <p:spPr>
           <a:xfrm>
-            <a:off x="567360" y="3320280"/>
-            <a:ext cx="6427800" cy="2290320"/>
+            <a:off x="378000" y="426240"/>
+            <a:ext cx="6806160" cy="1784520"/>
           </a:xfrm>
           <a:prstGeom prst="rect">
             <a:avLst/>
@@ -717,8 +717,8 @@
         </p:nvSpPr>
         <p:spPr>
           <a:xfrm>
-            <a:off x="567360" y="3320280"/>
-            <a:ext cx="6427800" cy="2290320"/>
+            <a:off x="378000" y="426240"/>
+            <a:ext cx="6806160" cy="1784520"/>
           </a:xfrm>
           <a:prstGeom prst="rect">
             <a:avLst/>
@@ -950,8 +950,8 @@
         </p:nvSpPr>
         <p:spPr>
           <a:xfrm>
-            <a:off x="567360" y="3320280"/>
-            <a:ext cx="6427800" cy="2290320"/>
+            <a:off x="378000" y="426240"/>
+            <a:ext cx="6806160" cy="1784520"/>
           </a:xfrm>
           <a:prstGeom prst="rect">
             <a:avLst/>
@@ -1034,8 +1034,8 @@
         </p:nvSpPr>
         <p:spPr>
           <a:xfrm>
-            <a:off x="567360" y="3320280"/>
-            <a:ext cx="6427800" cy="2290320"/>
+            <a:off x="378000" y="426240"/>
+            <a:ext cx="6806160" cy="1784520"/>
           </a:xfrm>
           <a:prstGeom prst="rect">
             <a:avLst/>
@@ -1117,8 +1117,8 @@
         </p:nvSpPr>
         <p:spPr>
           <a:xfrm>
-            <a:off x="567360" y="3320280"/>
-            <a:ext cx="6427800" cy="2290320"/>
+            <a:off x="378000" y="426240"/>
+            <a:ext cx="6806160" cy="1784520"/>
           </a:xfrm>
           <a:prstGeom prst="rect">
             <a:avLst/>
@@ -1230,8 +1230,8 @@
         </p:nvSpPr>
         <p:spPr>
           <a:xfrm>
-            <a:off x="567360" y="3320280"/>
-            <a:ext cx="6427800" cy="2290320"/>
+            <a:off x="378000" y="426240"/>
+            <a:ext cx="6806160" cy="1784520"/>
           </a:xfrm>
           <a:prstGeom prst="rect">
             <a:avLst/>
@@ -1283,8 +1283,8 @@
         </p:nvSpPr>
         <p:spPr>
           <a:xfrm>
-            <a:off x="567360" y="3320280"/>
-            <a:ext cx="6427800" cy="10617840"/>
+            <a:off x="378000" y="426240"/>
+            <a:ext cx="6806160" cy="8273160"/>
           </a:xfrm>
           <a:prstGeom prst="rect">
             <a:avLst/>
@@ -1336,8 +1336,8 @@
         </p:nvSpPr>
         <p:spPr>
           <a:xfrm>
-            <a:off x="567360" y="3320280"/>
-            <a:ext cx="6427800" cy="2290320"/>
+            <a:off x="378000" y="426240"/>
+            <a:ext cx="6806160" cy="1784520"/>
           </a:xfrm>
           <a:prstGeom prst="rect">
             <a:avLst/>
@@ -1479,8 +1479,8 @@
         </p:nvSpPr>
         <p:spPr>
           <a:xfrm>
-            <a:off x="567360" y="3320280"/>
-            <a:ext cx="6427800" cy="2290320"/>
+            <a:off x="378000" y="426240"/>
+            <a:ext cx="6806160" cy="1784520"/>
           </a:xfrm>
           <a:prstGeom prst="rect">
             <a:avLst/>
@@ -1622,8 +1622,8 @@
         </p:nvSpPr>
         <p:spPr>
           <a:xfrm>
-            <a:off x="567360" y="3320280"/>
-            <a:ext cx="6427800" cy="2290320"/>
+            <a:off x="378000" y="426240"/>
+            <a:ext cx="6806160" cy="1784520"/>
           </a:xfrm>
           <a:prstGeom prst="rect">
             <a:avLst/>
@@ -1772,8 +1772,8 @@
         </p:nvSpPr>
         <p:spPr>
           <a:xfrm>
-            <a:off x="567360" y="3320280"/>
-            <a:ext cx="6427800" cy="2290320"/>
+            <a:off x="378000" y="426240"/>
+            <a:ext cx="6806160" cy="1784520"/>
           </a:xfrm>
           <a:prstGeom prst="rect">
             <a:avLst/>
@@ -1784,13 +1784,50 @@
             <a:noAutofit/>
           </a:bodyPr>
           <a:p>
+            <a:pPr algn="ctr"/>
             <a:r>
-              <a:rPr b="0" lang="fr-FR" sz="1800" spc="-1" strike="noStrike">
+              <a:rPr b="0" lang="fr-FR" sz="4400" spc="-1" strike="noStrike">
                 <a:latin typeface="Arial"/>
               </a:rPr>
-              <a:t>Cliquez pour éditer le format du texte-titre</a:t>
+              <a:t>Cliquez </a:t>
             </a:r>
-            <a:endParaRPr b="0" lang="fr-FR" sz="1800" spc="-1" strike="noStrike">
+            <a:r>
+              <a:rPr b="0" lang="fr-FR" sz="4400" spc="-1" strike="noStrike">
+                <a:latin typeface="Arial"/>
+              </a:rPr>
+              <a:t>pour </a:t>
+            </a:r>
+            <a:r>
+              <a:rPr b="0" lang="fr-FR" sz="4400" spc="-1" strike="noStrike">
+                <a:latin typeface="Arial"/>
+              </a:rPr>
+              <a:t>éditer le </a:t>
+            </a:r>
+            <a:r>
+              <a:rPr b="0" lang="fr-FR" sz="4400" spc="-1" strike="noStrike">
+                <a:latin typeface="Arial"/>
+              </a:rPr>
+              <a:t>format </a:t>
+            </a:r>
+            <a:r>
+              <a:rPr b="0" lang="fr-FR" sz="4400" spc="-1" strike="noStrike">
+                <a:latin typeface="Arial"/>
+              </a:rPr>
+              <a:t>du </a:t>
+            </a:r>
+            <a:r>
+              <a:rPr b="0" lang="fr-FR" sz="4400" spc="-1" strike="noStrike">
+                <a:latin typeface="Arial"/>
+              </a:rPr>
+              <a:t>texte-</a:t>
+            </a:r>
+            <a:r>
+              <a:rPr b="0" lang="fr-FR" sz="4400" spc="-1" strike="noStrike">
+                <a:latin typeface="Arial"/>
+              </a:rPr>
+              <a:t>titre</a:t>
+            </a:r>
+            <a:endParaRPr b="0" lang="fr-FR" sz="4400" spc="-1" strike="noStrike">
               <a:latin typeface="Arial"/>
             </a:endParaRPr>
           </a:p>
@@ -2020,8 +2057,8 @@
         </p:nvSpPr>
         <p:spPr>
           <a:xfrm>
-            <a:off x="-2880" y="7030080"/>
-            <a:ext cx="4794480" cy="380520"/>
+            <a:off x="0" y="6675840"/>
+            <a:ext cx="4793760" cy="379800"/>
           </a:xfrm>
           <a:prstGeom prst="rect">
             <a:avLst/>
@@ -2057,8 +2094,8 @@
         </p:nvSpPr>
         <p:spPr>
           <a:xfrm>
-            <a:off x="3600" y="2199600"/>
-            <a:ext cx="4787640" cy="380520"/>
+            <a:off x="5040" y="1958040"/>
+            <a:ext cx="4786920" cy="379800"/>
           </a:xfrm>
           <a:prstGeom prst="rect">
             <a:avLst/>
@@ -2095,7 +2132,7 @@
         <p:spPr>
           <a:xfrm>
             <a:off x="4792320" y="2094120"/>
-            <a:ext cx="2773080" cy="1958760"/>
+            <a:ext cx="2772360" cy="1958040"/>
           </a:xfrm>
           <a:prstGeom prst="rect">
             <a:avLst/>
@@ -2131,7 +2168,7 @@
         <p:spPr>
           <a:xfrm>
             <a:off x="4792320" y="3901320"/>
-            <a:ext cx="2773080" cy="1665360"/>
+            <a:ext cx="2772360" cy="1664640"/>
           </a:xfrm>
           <a:prstGeom prst="rect">
             <a:avLst/>
@@ -2167,7 +2204,7 @@
         <p:spPr>
           <a:xfrm>
             <a:off x="4792320" y="5567400"/>
-            <a:ext cx="2773080" cy="2598120"/>
+            <a:ext cx="2772360" cy="2597400"/>
           </a:xfrm>
           <a:prstGeom prst="rect">
             <a:avLst/>
@@ -2203,7 +2240,7 @@
         <p:spPr>
           <a:xfrm>
             <a:off x="4792320" y="2385720"/>
-            <a:ext cx="2773080" cy="396000"/>
+            <a:ext cx="2772360" cy="395280"/>
           </a:xfrm>
           <a:prstGeom prst="rect">
             <a:avLst/>
@@ -2237,7 +2274,7 @@
         <p:spPr>
           <a:xfrm>
             <a:off x="4409280" y="4047120"/>
-            <a:ext cx="3156120" cy="396000"/>
+            <a:ext cx="3155400" cy="395280"/>
           </a:xfrm>
           <a:prstGeom prst="rect">
             <a:avLst/>
@@ -2271,7 +2308,7 @@
         <p:spPr>
           <a:xfrm>
             <a:off x="4792320" y="8173800"/>
-            <a:ext cx="2773080" cy="2189520"/>
+            <a:ext cx="2772360" cy="2188800"/>
           </a:xfrm>
           <a:prstGeom prst="rect">
             <a:avLst/>
@@ -2307,7 +2344,7 @@
         <p:spPr>
           <a:xfrm>
             <a:off x="4792320" y="5716080"/>
-            <a:ext cx="2773080" cy="396000"/>
+            <a:ext cx="2772360" cy="395280"/>
           </a:xfrm>
           <a:prstGeom prst="rect">
             <a:avLst/>
@@ -2341,7 +2378,7 @@
         <p:spPr>
           <a:xfrm>
             <a:off x="4792320" y="8317080"/>
-            <a:ext cx="2773080" cy="396000"/>
+            <a:ext cx="2772360" cy="395280"/>
           </a:xfrm>
           <a:prstGeom prst="rect">
             <a:avLst/>
@@ -2374,8 +2411,8 @@
         </p:nvSpPr>
         <p:spPr>
           <a:xfrm>
-            <a:off x="3240" y="284040"/>
-            <a:ext cx="7561800" cy="1396800"/>
+            <a:off x="0" y="259560"/>
+            <a:ext cx="7561080" cy="1396080"/>
           </a:xfrm>
           <a:prstGeom prst="rect">
             <a:avLst/>
@@ -2413,8 +2450,8 @@
         </p:nvSpPr>
         <p:spPr>
           <a:xfrm>
-            <a:off x="1204560" y="650160"/>
-            <a:ext cx="4478760" cy="1308240"/>
+            <a:off x="1204560" y="252720"/>
+            <a:ext cx="4478040" cy="1307520"/>
           </a:xfrm>
           <a:prstGeom prst="rect">
             <a:avLst/>
@@ -2464,8 +2501,8 @@
         </p:nvSpPr>
         <p:spPr>
           <a:xfrm>
-            <a:off x="269280" y="2180880"/>
-            <a:ext cx="2576160" cy="394920"/>
+            <a:off x="288000" y="1958040"/>
+            <a:ext cx="2575440" cy="394200"/>
           </a:xfrm>
           <a:prstGeom prst="rect">
             <a:avLst/>
@@ -2514,8 +2551,8 @@
           <p:nvPr/>
         </p:nvGraphicFramePr>
         <p:xfrm>
-          <a:off x="104760" y="2586240"/>
-          <a:ext cx="4303800" cy="5121000"/>
+          <a:off x="49320" y="2338560"/>
+          <a:ext cx="4303800" cy="5173920"/>
         </p:xfrm>
         <a:graphic>
           <a:graphicData uri="http://schemas.openxmlformats.org/drawingml/2006/table">
@@ -2524,7 +2561,7 @@
               <a:tblGrid>
                 <a:gridCol w="4304160"/>
               </a:tblGrid>
-              <a:tr h="3387600">
+              <a:tr h="3315600">
                 <a:tc>
                   <a:txBody>
                     <a:bodyPr lIns="55080" rIns="55080">
@@ -2714,7 +2751,7 @@
                           <a:latin typeface="Calibri"/>
                           <a:ea typeface="Calibri"/>
                         </a:rPr>
-                        <a:t>Conseil et vente de produit pour Canal+, Coriolis Telecom, Direxi</a:t>
+                        <a:t>Conseil et vente de produits</a:t>
                       </a:r>
                       <a:endParaRPr b="0" lang="fr-FR" sz="1100" spc="-1" strike="noStrike">
                         <a:latin typeface="Arial"/>
@@ -2958,7 +2995,7 @@
                   </a:tcPr>
                 </a:tc>
               </a:tr>
-              <a:tr h="557280">
+              <a:tr h="581040">
                 <a:tc>
                   <a:txBody>
                     <a:bodyPr lIns="55080" rIns="55080">
@@ -3052,7 +3089,7 @@
                   </a:tcPr>
                 </a:tc>
               </a:tr>
-              <a:tr h="724680">
+              <a:tr h="417960">
                 <a:tc>
                   <a:txBody>
                     <a:bodyPr lIns="55080" rIns="55080">
@@ -3103,26 +3140,6 @@
                           <a:ea typeface="Calibri"/>
                         </a:rPr>
                         <a:t>Agent distributeur et Agent de cabine auxiliaire</a:t>
-                      </a:r>
-                      <a:endParaRPr b="0" lang="fr-FR" sz="1100" spc="-1" strike="noStrike">
-                        <a:latin typeface="Arial"/>
-                      </a:endParaRPr>
-                    </a:p>
-                    <a:p>
-                      <a:pPr>
-                        <a:lnSpc>
-                          <a:spcPct val="100000"/>
-                        </a:lnSpc>
-                      </a:pPr>
-                      <a:r>
-                        <a:rPr b="0" lang="fr-FR" sz="1100" spc="-1" strike="noStrike">
-                          <a:solidFill>
-                            <a:srgbClr val="7f7f7f"/>
-                          </a:solidFill>
-                          <a:latin typeface="Calibri"/>
-                          <a:ea typeface="Calibri"/>
-                        </a:rPr>
-                        <a:t>Livraison courrier, colis et Saisie arrivée et départ  des plis et colis suivis</a:t>
                       </a:r>
                       <a:endParaRPr b="0" lang="fr-FR" sz="1100" spc="-1" strike="noStrike">
                         <a:latin typeface="Arial"/>
@@ -3146,43 +3163,8 @@
                   </a:tcPr>
                 </a:tc>
               </a:tr>
-              <a:tr h="451800">
+              <a:tr h="859680">
                 <a:tc>
-                  <a:txBody>
-                    <a:bodyPr lIns="86040" rIns="86040">
-                      <a:noAutofit/>
-                    </a:bodyPr>
-                    <a:p>
-                      <a:pPr>
-                        <a:lnSpc>
-                          <a:spcPct val="100000"/>
-                        </a:lnSpc>
-                      </a:pPr>
-                      <a:endParaRPr b="0" lang="fr-FR" sz="1800" spc="-1" strike="noStrike">
-                        <a:latin typeface="Arial"/>
-                      </a:endParaRPr>
-                    </a:p>
-                    <a:p>
-                      <a:pPr>
-                        <a:lnSpc>
-                          <a:spcPct val="100000"/>
-                        </a:lnSpc>
-                      </a:pPr>
-                      <a:endParaRPr b="0" lang="fr-FR" sz="1800" spc="-1" strike="noStrike">
-                        <a:latin typeface="Arial"/>
-                      </a:endParaRPr>
-                    </a:p>
-                    <a:p>
-                      <a:pPr>
-                        <a:lnSpc>
-                          <a:spcPct val="100000"/>
-                        </a:lnSpc>
-                      </a:pPr>
-                      <a:endParaRPr b="0" lang="fr-FR" sz="1800" spc="-1" strike="noStrike">
-                        <a:latin typeface="Arial"/>
-                      </a:endParaRPr>
-                    </a:p>
-                  </a:txBody>
                   <a:tcPr marL="86040" marR="86040">
                     <a:lnL w="2880">
                       <a:noFill/>
@@ -3212,8 +3194,8 @@
         </p:nvSpPr>
         <p:spPr>
           <a:xfrm>
-            <a:off x="269280" y="7014600"/>
-            <a:ext cx="2576160" cy="394920"/>
+            <a:off x="304200" y="6684120"/>
+            <a:ext cx="2575440" cy="394200"/>
           </a:xfrm>
           <a:prstGeom prst="rect">
             <a:avLst/>
@@ -3262,17 +3244,17 @@
           <p:nvPr/>
         </p:nvGraphicFramePr>
         <p:xfrm>
-          <a:off x="122400" y="7419960"/>
-          <a:ext cx="4303800" cy="3554640"/>
+          <a:off x="63720" y="7034400"/>
+          <a:ext cx="4292280" cy="4047120"/>
         </p:xfrm>
         <a:graphic>
           <a:graphicData uri="http://schemas.openxmlformats.org/drawingml/2006/table">
             <a:tbl>
               <a:tblPr/>
               <a:tblGrid>
-                <a:gridCol w="4304160"/>
+                <a:gridCol w="4292640"/>
               </a:tblGrid>
-              <a:tr h="1059480">
+              <a:tr h="1551960">
                 <a:tc>
                   <a:txBody>
                     <a:bodyPr lIns="55080" rIns="55080">
@@ -3292,8 +3274,58 @@
                           <a:latin typeface="Calibri"/>
                           <a:ea typeface="Calibri"/>
                         </a:rPr>
-                        <a:t>2018-2019 Développeur Web et Web mobile – La Manu – Amiens- 6mois</a:t>
-                      </a:r>
+                        <a:t>2018-2019 Développeur Web et Web mobile – </a:t>
+                      </a:r>
+                      <a:r>
+                        <a:rPr b="1" lang="fr-FR" sz="1100" spc="-1" strike="noStrike">
+                          <a:solidFill>
+                            <a:srgbClr val="5797b8"/>
+                          </a:solidFill>
+                          <a:latin typeface="Calibri"/>
+                          <a:ea typeface="Calibri"/>
+                        </a:rPr>
+                        <a:t>La manu</a:t>
+                      </a:r>
+                      <a:r>
+                        <a:rPr b="1" lang="fr-FR" sz="1100" spc="-1" strike="noStrike">
+                          <a:solidFill>
+                            <a:srgbClr val="000000"/>
+                          </a:solidFill>
+                          <a:latin typeface="Calibri"/>
+                          <a:ea typeface="Calibri"/>
+                        </a:rPr>
+                        <a:t> – </a:t>
+                      </a:r>
+                      <a:r>
+                        <a:rPr b="1" lang="fr-FR" sz="1100" spc="-1" strike="noStrike">
+                          <a:solidFill>
+                            <a:srgbClr val="5797b8"/>
+                          </a:solidFill>
+                          <a:latin typeface="Calibri"/>
+                          <a:ea typeface="Calibri"/>
+                        </a:rPr>
+                        <a:t>Amiens</a:t>
+                      </a:r>
+                      <a:r>
+                        <a:rPr b="1" lang="fr-FR" sz="1100" spc="-1" strike="noStrike">
+                          <a:solidFill>
+                            <a:srgbClr val="000000"/>
+                          </a:solidFill>
+                          <a:latin typeface="Calibri"/>
+                          <a:ea typeface="Calibri"/>
+                        </a:rPr>
+                        <a:t> – 6mois</a:t>
+                      </a:r>
+                      <a:endParaRPr b="0" lang="fr-FR" sz="1100" spc="-1" strike="noStrike">
+                        <a:latin typeface="Arial"/>
+                      </a:endParaRPr>
+                    </a:p>
+                    <a:p>
+                      <a:pPr>
+                        <a:lnSpc>
+                          <a:spcPct val="100000"/>
+                        </a:lnSpc>
+                      </a:pPr>
                       <a:endParaRPr b="0" lang="fr-FR" sz="1100" spc="-1" strike="noStrike">
                         <a:latin typeface="Arial"/>
                       </a:endParaRPr>
@@ -3797,7 +3829,7 @@
         <p:spPr>
           <a:xfrm>
             <a:off x="5148720" y="2354400"/>
-            <a:ext cx="2264400" cy="394920"/>
+            <a:ext cx="2263680" cy="394200"/>
           </a:xfrm>
           <a:prstGeom prst="rect">
             <a:avLst/>
@@ -3990,7 +4022,7 @@
         <p:spPr>
           <a:xfrm>
             <a:off x="5151600" y="4055400"/>
-            <a:ext cx="2264400" cy="394920"/>
+            <a:ext cx="2263680" cy="394200"/>
           </a:xfrm>
           <a:prstGeom prst="rect">
             <a:avLst/>
@@ -4146,7 +4178,7 @@
         <p:spPr>
           <a:xfrm>
             <a:off x="5148720" y="5703840"/>
-            <a:ext cx="2264400" cy="394920"/>
+            <a:ext cx="2263680" cy="394200"/>
           </a:xfrm>
           <a:prstGeom prst="rect">
             <a:avLst/>
@@ -4197,7 +4229,7 @@
         <p:spPr>
           <a:xfrm>
             <a:off x="5148720" y="8310960"/>
-            <a:ext cx="2264400" cy="394920"/>
+            <a:ext cx="2263680" cy="394200"/>
           </a:xfrm>
           <a:prstGeom prst="rect">
             <a:avLst/>
@@ -4247,7 +4279,7 @@
         </p:nvGraphicFramePr>
         <p:xfrm>
           <a:off x="5033520" y="6153480"/>
-          <a:ext cx="2328480" cy="1776240"/>
+          <a:ext cx="2328480" cy="1775520"/>
         </p:xfrm>
         <a:graphic>
           <a:graphicData uri="http://schemas.openxmlformats.org/drawingml/2006/table">
@@ -4384,7 +4416,7 @@
                   </a:tcPr>
                 </a:tc>
               </a:tr>
-              <a:tr h="336600">
+              <a:tr h="335880">
                 <a:tc>
                   <a:txBody>
                     <a:bodyPr>
@@ -4586,7 +4618,7 @@
         <p:spPr>
           <a:xfrm>
             <a:off x="5125320" y="6475680"/>
-            <a:ext cx="2026080" cy="55080"/>
+            <a:ext cx="2025360" cy="54360"/>
           </a:xfrm>
           <a:prstGeom prst="rect">
             <a:avLst/>
@@ -4623,7 +4655,7 @@
         <p:spPr>
           <a:xfrm>
             <a:off x="5123160" y="6463800"/>
-            <a:ext cx="1677240" cy="77760"/>
+            <a:ext cx="1676520" cy="77040"/>
           </a:xfrm>
           <a:prstGeom prst="rect">
             <a:avLst/>
@@ -4657,7 +4689,7 @@
         <p:spPr>
           <a:xfrm>
             <a:off x="5125320" y="6804360"/>
-            <a:ext cx="2026080" cy="55080"/>
+            <a:ext cx="2025360" cy="54360"/>
           </a:xfrm>
           <a:prstGeom prst="rect">
             <a:avLst/>
@@ -4694,7 +4726,7 @@
         <p:spPr>
           <a:xfrm>
             <a:off x="5125320" y="6797520"/>
-            <a:ext cx="1284840" cy="62280"/>
+            <a:ext cx="1284120" cy="61560"/>
           </a:xfrm>
           <a:prstGeom prst="rect">
             <a:avLst/>
@@ -4728,7 +4760,7 @@
         <p:spPr>
           <a:xfrm>
             <a:off x="5131440" y="7149600"/>
-            <a:ext cx="2026080" cy="55080"/>
+            <a:ext cx="2025360" cy="54360"/>
           </a:xfrm>
           <a:prstGeom prst="rect">
             <a:avLst/>
@@ -4765,7 +4797,7 @@
         <p:spPr>
           <a:xfrm>
             <a:off x="5131440" y="7149600"/>
-            <a:ext cx="995400" cy="54720"/>
+            <a:ext cx="994680" cy="54000"/>
           </a:xfrm>
           <a:prstGeom prst="rect">
             <a:avLst/>
@@ -4799,7 +4831,7 @@
         <p:spPr>
           <a:xfrm>
             <a:off x="5123160" y="7512120"/>
-            <a:ext cx="2026080" cy="55080"/>
+            <a:ext cx="2025360" cy="54360"/>
           </a:xfrm>
           <a:prstGeom prst="rect">
             <a:avLst/>
@@ -4836,7 +4868,7 @@
         <p:spPr>
           <a:xfrm>
             <a:off x="5115240" y="7502760"/>
-            <a:ext cx="1640160" cy="72000"/>
+            <a:ext cx="1639440" cy="71280"/>
           </a:xfrm>
           <a:prstGeom prst="rect">
             <a:avLst/>
@@ -4870,7 +4902,7 @@
         <p:spPr>
           <a:xfrm>
             <a:off x="5136840" y="7851600"/>
-            <a:ext cx="2026080" cy="55080"/>
+            <a:ext cx="2025360" cy="54360"/>
           </a:xfrm>
           <a:prstGeom prst="rect">
             <a:avLst/>
@@ -4907,7 +4939,7 @@
         <p:spPr>
           <a:xfrm>
             <a:off x="5136840" y="7851240"/>
-            <a:ext cx="1814760" cy="54720"/>
+            <a:ext cx="1814040" cy="54000"/>
           </a:xfrm>
           <a:prstGeom prst="rect">
             <a:avLst/>
@@ -4941,7 +4973,7 @@
         <p:spPr>
           <a:xfrm>
             <a:off x="5233680" y="9018360"/>
-            <a:ext cx="2026080" cy="55080"/>
+            <a:ext cx="2025360" cy="54360"/>
           </a:xfrm>
           <a:prstGeom prst="rect">
             <a:avLst/>
@@ -4978,7 +5010,7 @@
         <p:spPr>
           <a:xfrm>
             <a:off x="5228280" y="9023760"/>
-            <a:ext cx="1814760" cy="54720"/>
+            <a:ext cx="1814040" cy="54000"/>
           </a:xfrm>
           <a:prstGeom prst="rect">
             <a:avLst/>
@@ -5012,7 +5044,7 @@
         <p:spPr>
           <a:xfrm>
             <a:off x="5235480" y="9440280"/>
-            <a:ext cx="2026080" cy="55080"/>
+            <a:ext cx="2025360" cy="54360"/>
           </a:xfrm>
           <a:prstGeom prst="rect">
             <a:avLst/>
@@ -5049,7 +5081,7 @@
         <p:spPr>
           <a:xfrm>
             <a:off x="5228280" y="9442440"/>
-            <a:ext cx="1369080" cy="54720"/>
+            <a:ext cx="1368360" cy="54000"/>
           </a:xfrm>
           <a:prstGeom prst="rect">
             <a:avLst/>
@@ -5083,7 +5115,7 @@
         <p:spPr>
           <a:xfrm>
             <a:off x="5259600" y="9759600"/>
-            <a:ext cx="2026080" cy="55080"/>
+            <a:ext cx="2025360" cy="54360"/>
           </a:xfrm>
           <a:prstGeom prst="rect">
             <a:avLst/>
@@ -5120,7 +5152,7 @@
         <p:spPr>
           <a:xfrm>
             <a:off x="5238360" y="9757800"/>
-            <a:ext cx="959040" cy="61200"/>
+            <a:ext cx="958320" cy="60480"/>
           </a:xfrm>
           <a:prstGeom prst="rect">
             <a:avLst/>
@@ -5158,7 +5190,7 @@
         <p:spPr>
           <a:xfrm>
             <a:off x="5238360" y="10162080"/>
-            <a:ext cx="2023200" cy="54000"/>
+            <a:ext cx="2022480" cy="53280"/>
           </a:xfrm>
           <a:prstGeom prst="rect">
             <a:avLst/>
@@ -5181,7 +5213,7 @@
         <p:spPr>
           <a:xfrm>
             <a:off x="5238360" y="10155960"/>
-            <a:ext cx="1285560" cy="60120"/>
+            <a:ext cx="1284840" cy="59400"/>
           </a:xfrm>
           <a:prstGeom prst="rect">
             <a:avLst/>

</xml_diff>